<commit_message>
SWEN Assignment Report & PPT
</commit_message>
<xml_diff>
--- a/SWEN Assignment Report & PPT/Assignment 1/SWEN Assignment 1 PPT Finalized.pptx
+++ b/SWEN Assignment Report & PPT/Assignment 1/SWEN Assignment 1 PPT Finalized.pptx
@@ -10,8 +10,8 @@
   <p:sldIdLst>
     <p:sldId id="264" r:id="rId2"/>
     <p:sldId id="258" r:id="rId3"/>
-    <p:sldId id="257" r:id="rId4"/>
-    <p:sldId id="259" r:id="rId5"/>
+    <p:sldId id="259" r:id="rId4"/>
+    <p:sldId id="257" r:id="rId5"/>
     <p:sldId id="268" r:id="rId6"/>
     <p:sldId id="269" r:id="rId7"/>
     <p:sldId id="270" r:id="rId8"/>
@@ -210,7 +210,7 @@
           <a:p>
             <a:fld id="{A0EA22B3-B609-4475-8304-679E1ACD5846}" type="datetimeFigureOut">
               <a:rPr lang="en-SG" smtClean="0"/>
-              <a:t>2/6/2015</a:t>
+              <a:t>3/6/2015</a:t>
             </a:fld>
             <a:endParaRPr lang="en-SG"/>
           </a:p>
@@ -1311,7 +1311,7 @@
           <a:p>
             <a:fld id="{94BA57AA-FF41-45A9-8634-E6463A98609D}" type="slidenum">
               <a:rPr lang="en-SG" smtClean="0"/>
-              <a:t>3</a:t>
+              <a:t>4</a:t>
             </a:fld>
             <a:endParaRPr lang="en-SG"/>
           </a:p>
@@ -2538,7 +2538,7 @@
           <a:noFill/>
           <a:extLst>
             <a:ext uri="{909E8E84-426E-40dd-AFC4-6F175D3DCCD1}">
-              <a14:hiddenFill xmlns:a14="http://schemas.microsoft.com/office/drawing/2010/main" xmlns="">
+              <a14:hiddenFill xmlns="" xmlns:a14="http://schemas.microsoft.com/office/drawing/2010/main">
                 <a:solidFill>
                   <a:srgbClr val="FFFFFF"/>
                 </a:solidFill>
@@ -2597,7 +2597,7 @@
             </a:ln>
             <a:extLst>
               <a:ext uri="{91240B29-F687-4f45-9708-019B960494DF}">
-                <a14:hiddenLine xmlns:a14="http://schemas.microsoft.com/office/drawing/2010/main" xmlns="" w="9525">
+                <a14:hiddenLine xmlns="" xmlns:a14="http://schemas.microsoft.com/office/drawing/2010/main" w="9525">
                   <a:solidFill>
                     <a:srgbClr val="000000"/>
                   </a:solidFill>
@@ -2687,7 +2687,7 @@
             </a:ln>
             <a:extLst>
               <a:ext uri="{91240B29-F687-4f45-9708-019B960494DF}">
-                <a14:hiddenLine xmlns:a14="http://schemas.microsoft.com/office/drawing/2010/main" xmlns="" w="9525">
+                <a14:hiddenLine xmlns="" xmlns:a14="http://schemas.microsoft.com/office/drawing/2010/main" w="9525">
                   <a:solidFill>
                     <a:srgbClr val="000000"/>
                   </a:solidFill>
@@ -2777,7 +2777,7 @@
             </a:ln>
             <a:extLst>
               <a:ext uri="{91240B29-F687-4f45-9708-019B960494DF}">
-                <a14:hiddenLine xmlns:a14="http://schemas.microsoft.com/office/drawing/2010/main" xmlns="" w="9525">
+                <a14:hiddenLine xmlns="" xmlns:a14="http://schemas.microsoft.com/office/drawing/2010/main" w="9525">
                   <a:solidFill>
                     <a:srgbClr val="000000"/>
                   </a:solidFill>
@@ -2811,7 +2811,7 @@
             </a:ln>
             <a:extLst>
               <a:ext uri="{91240B29-F687-4f45-9708-019B960494DF}">
-                <a14:hiddenLine xmlns:a14="http://schemas.microsoft.com/office/drawing/2010/main" xmlns="" w="9525">
+                <a14:hiddenLine xmlns="" xmlns:a14="http://schemas.microsoft.com/office/drawing/2010/main" w="9525">
                   <a:solidFill>
                     <a:srgbClr val="000000"/>
                   </a:solidFill>
@@ -2901,7 +2901,7 @@
             </a:ln>
             <a:extLst>
               <a:ext uri="{91240B29-F687-4f45-9708-019B960494DF}">
-                <a14:hiddenLine xmlns:a14="http://schemas.microsoft.com/office/drawing/2010/main" xmlns="" w="9525">
+                <a14:hiddenLine xmlns="" xmlns:a14="http://schemas.microsoft.com/office/drawing/2010/main" w="9525">
                   <a:solidFill>
                     <a:srgbClr val="000000"/>
                   </a:solidFill>
@@ -2963,7 +2963,7 @@
             </a:ln>
             <a:extLst>
               <a:ext uri="{91240B29-F687-4f45-9708-019B960494DF}">
-                <a14:hiddenLine xmlns:a14="http://schemas.microsoft.com/office/drawing/2010/main" xmlns="" w="9525">
+                <a14:hiddenLine xmlns="" xmlns:a14="http://schemas.microsoft.com/office/drawing/2010/main" w="9525">
                   <a:solidFill>
                     <a:srgbClr val="000000"/>
                   </a:solidFill>
@@ -3025,7 +3025,7 @@
             </a:ln>
             <a:extLst>
               <a:ext uri="{91240B29-F687-4f45-9708-019B960494DF}">
-                <a14:hiddenLine xmlns:a14="http://schemas.microsoft.com/office/drawing/2010/main" xmlns="" w="9525">
+                <a14:hiddenLine xmlns="" xmlns:a14="http://schemas.microsoft.com/office/drawing/2010/main" w="9525">
                   <a:solidFill>
                     <a:srgbClr val="000000"/>
                   </a:solidFill>
@@ -3115,7 +3115,7 @@
             </a:ln>
             <a:extLst>
               <a:ext uri="{91240B29-F687-4f45-9708-019B960494DF}">
-                <a14:hiddenLine xmlns:a14="http://schemas.microsoft.com/office/drawing/2010/main" xmlns="" w="9525">
+                <a14:hiddenLine xmlns="" xmlns:a14="http://schemas.microsoft.com/office/drawing/2010/main" w="9525">
                   <a:solidFill>
                     <a:srgbClr val="000000"/>
                   </a:solidFill>
@@ -3177,7 +3177,7 @@
             </a:ln>
             <a:extLst>
               <a:ext uri="{91240B29-F687-4f45-9708-019B960494DF}">
-                <a14:hiddenLine xmlns:a14="http://schemas.microsoft.com/office/drawing/2010/main" xmlns="" w="9525">
+                <a14:hiddenLine xmlns="" xmlns:a14="http://schemas.microsoft.com/office/drawing/2010/main" w="9525">
                   <a:solidFill>
                     <a:srgbClr val="000000"/>
                   </a:solidFill>
@@ -3239,7 +3239,7 @@
             </a:ln>
             <a:extLst>
               <a:ext uri="{91240B29-F687-4f45-9708-019B960494DF}">
-                <a14:hiddenLine xmlns:a14="http://schemas.microsoft.com/office/drawing/2010/main" xmlns="" w="9525">
+                <a14:hiddenLine xmlns="" xmlns:a14="http://schemas.microsoft.com/office/drawing/2010/main" w="9525">
                   <a:solidFill>
                     <a:srgbClr val="000000"/>
                   </a:solidFill>
@@ -3329,7 +3329,7 @@
             </a:ln>
             <a:extLst>
               <a:ext uri="{91240B29-F687-4f45-9708-019B960494DF}">
-                <a14:hiddenLine xmlns:a14="http://schemas.microsoft.com/office/drawing/2010/main" xmlns="" w="9525">
+                <a14:hiddenLine xmlns="" xmlns:a14="http://schemas.microsoft.com/office/drawing/2010/main" w="9525">
                   <a:solidFill>
                     <a:srgbClr val="000000"/>
                   </a:solidFill>
@@ -3419,7 +3419,7 @@
             </a:ln>
             <a:extLst>
               <a:ext uri="{91240B29-F687-4f45-9708-019B960494DF}">
-                <a14:hiddenLine xmlns:a14="http://schemas.microsoft.com/office/drawing/2010/main" xmlns="" w="9525">
+                <a14:hiddenLine xmlns="" xmlns:a14="http://schemas.microsoft.com/office/drawing/2010/main" w="9525">
                   <a:solidFill>
                     <a:srgbClr val="000000"/>
                   </a:solidFill>
@@ -3481,7 +3481,7 @@
             </a:ln>
             <a:extLst>
               <a:ext uri="{91240B29-F687-4f45-9708-019B960494DF}">
-                <a14:hiddenLine xmlns:a14="http://schemas.microsoft.com/office/drawing/2010/main" xmlns="" w="9525">
+                <a14:hiddenLine xmlns="" xmlns:a14="http://schemas.microsoft.com/office/drawing/2010/main" w="9525">
                   <a:solidFill>
                     <a:srgbClr val="000000"/>
                   </a:solidFill>
@@ -3591,7 +3591,7 @@
             </a:ln>
             <a:extLst>
               <a:ext uri="{91240B29-F687-4f45-9708-019B960494DF}">
-                <a14:hiddenLine xmlns:a14="http://schemas.microsoft.com/office/drawing/2010/main" xmlns="" w="9525">
+                <a14:hiddenLine xmlns="" xmlns:a14="http://schemas.microsoft.com/office/drawing/2010/main" w="9525">
                   <a:solidFill>
                     <a:srgbClr val="000000"/>
                   </a:solidFill>
@@ -3653,7 +3653,7 @@
             </a:ln>
             <a:extLst>
               <a:ext uri="{91240B29-F687-4f45-9708-019B960494DF}">
-                <a14:hiddenLine xmlns:a14="http://schemas.microsoft.com/office/drawing/2010/main" xmlns="" w="9525">
+                <a14:hiddenLine xmlns="" xmlns:a14="http://schemas.microsoft.com/office/drawing/2010/main" w="9525">
                   <a:solidFill>
                     <a:srgbClr val="000000"/>
                   </a:solidFill>
@@ -3743,7 +3743,7 @@
             </a:ln>
             <a:extLst>
               <a:ext uri="{91240B29-F687-4f45-9708-019B960494DF}">
-                <a14:hiddenLine xmlns:a14="http://schemas.microsoft.com/office/drawing/2010/main" xmlns="" w="9525">
+                <a14:hiddenLine xmlns="" xmlns:a14="http://schemas.microsoft.com/office/drawing/2010/main" w="9525">
                   <a:solidFill>
                     <a:srgbClr val="000000"/>
                   </a:solidFill>
@@ -3833,7 +3833,7 @@
             </a:ln>
             <a:extLst>
               <a:ext uri="{91240B29-F687-4f45-9708-019B960494DF}">
-                <a14:hiddenLine xmlns:a14="http://schemas.microsoft.com/office/drawing/2010/main" xmlns="" w="9525">
+                <a14:hiddenLine xmlns="" xmlns:a14="http://schemas.microsoft.com/office/drawing/2010/main" w="9525">
                   <a:solidFill>
                     <a:srgbClr val="000000"/>
                   </a:solidFill>
@@ -3895,7 +3895,7 @@
             </a:ln>
             <a:extLst>
               <a:ext uri="{91240B29-F687-4f45-9708-019B960494DF}">
-                <a14:hiddenLine xmlns:a14="http://schemas.microsoft.com/office/drawing/2010/main" xmlns="" w="9525">
+                <a14:hiddenLine xmlns="" xmlns:a14="http://schemas.microsoft.com/office/drawing/2010/main" w="9525">
                   <a:solidFill>
                     <a:srgbClr val="000000"/>
                   </a:solidFill>
@@ -3985,7 +3985,7 @@
             </a:ln>
             <a:extLst>
               <a:ext uri="{91240B29-F687-4f45-9708-019B960494DF}">
-                <a14:hiddenLine xmlns:a14="http://schemas.microsoft.com/office/drawing/2010/main" xmlns="" w="9525">
+                <a14:hiddenLine xmlns="" xmlns:a14="http://schemas.microsoft.com/office/drawing/2010/main" w="9525">
                   <a:solidFill>
                     <a:srgbClr val="000000"/>
                   </a:solidFill>
@@ -4075,7 +4075,7 @@
             </a:ln>
             <a:extLst>
               <a:ext uri="{91240B29-F687-4f45-9708-019B960494DF}">
-                <a14:hiddenLine xmlns:a14="http://schemas.microsoft.com/office/drawing/2010/main" xmlns="" w="9525">
+                <a14:hiddenLine xmlns="" xmlns:a14="http://schemas.microsoft.com/office/drawing/2010/main" w="9525">
                   <a:solidFill>
                     <a:srgbClr val="000000"/>
                   </a:solidFill>
@@ -4131,7 +4131,7 @@
             </a:ln>
             <a:extLst>
               <a:ext uri="{91240B29-F687-4f45-9708-019B960494DF}">
-                <a14:hiddenLine xmlns:a14="http://schemas.microsoft.com/office/drawing/2010/main" xmlns="" w="9525">
+                <a14:hiddenLine xmlns="" xmlns:a14="http://schemas.microsoft.com/office/drawing/2010/main" w="9525">
                   <a:solidFill>
                     <a:srgbClr val="000000"/>
                   </a:solidFill>
@@ -4221,7 +4221,7 @@
             </a:ln>
             <a:extLst>
               <a:ext uri="{91240B29-F687-4f45-9708-019B960494DF}">
-                <a14:hiddenLine xmlns:a14="http://schemas.microsoft.com/office/drawing/2010/main" xmlns="" w="9525">
+                <a14:hiddenLine xmlns="" xmlns:a14="http://schemas.microsoft.com/office/drawing/2010/main" w="9525">
                   <a:solidFill>
                     <a:srgbClr val="000000"/>
                   </a:solidFill>
@@ -4277,7 +4277,7 @@
             </a:ln>
             <a:extLst>
               <a:ext uri="{91240B29-F687-4f45-9708-019B960494DF}">
-                <a14:hiddenLine xmlns:a14="http://schemas.microsoft.com/office/drawing/2010/main" xmlns="" w="9525">
+                <a14:hiddenLine xmlns="" xmlns:a14="http://schemas.microsoft.com/office/drawing/2010/main" w="9525">
                   <a:solidFill>
                     <a:srgbClr val="000000"/>
                   </a:solidFill>
@@ -4367,7 +4367,7 @@
             </a:ln>
             <a:extLst>
               <a:ext uri="{91240B29-F687-4f45-9708-019B960494DF}">
-                <a14:hiddenLine xmlns:a14="http://schemas.microsoft.com/office/drawing/2010/main" xmlns="" w="9525">
+                <a14:hiddenLine xmlns="" xmlns:a14="http://schemas.microsoft.com/office/drawing/2010/main" w="9525">
                   <a:solidFill>
                     <a:srgbClr val="000000"/>
                   </a:solidFill>
@@ -4435,7 +4435,7 @@
             </a:ln>
             <a:extLst>
               <a:ext uri="{91240B29-F687-4f45-9708-019B960494DF}">
-                <a14:hiddenLine xmlns:a14="http://schemas.microsoft.com/office/drawing/2010/main" xmlns="" w="9525">
+                <a14:hiddenLine xmlns="" xmlns:a14="http://schemas.microsoft.com/office/drawing/2010/main" w="9525">
                   <a:solidFill>
                     <a:srgbClr val="000000"/>
                   </a:solidFill>
@@ -4525,7 +4525,7 @@
             </a:ln>
             <a:extLst>
               <a:ext uri="{91240B29-F687-4f45-9708-019B960494DF}">
-                <a14:hiddenLine xmlns:a14="http://schemas.microsoft.com/office/drawing/2010/main" xmlns="" w="9525">
+                <a14:hiddenLine xmlns="" xmlns:a14="http://schemas.microsoft.com/office/drawing/2010/main" w="9525">
                   <a:solidFill>
                     <a:srgbClr val="000000"/>
                   </a:solidFill>
@@ -4593,7 +4593,7 @@
             </a:ln>
             <a:extLst>
               <a:ext uri="{91240B29-F687-4f45-9708-019B960494DF}">
-                <a14:hiddenLine xmlns:a14="http://schemas.microsoft.com/office/drawing/2010/main" xmlns="" w="9525">
+                <a14:hiddenLine xmlns="" xmlns:a14="http://schemas.microsoft.com/office/drawing/2010/main" w="9525">
                   <a:solidFill>
                     <a:srgbClr val="000000"/>
                   </a:solidFill>
@@ -4683,7 +4683,7 @@
             </a:ln>
             <a:extLst>
               <a:ext uri="{91240B29-F687-4f45-9708-019B960494DF}">
-                <a14:hiddenLine xmlns:a14="http://schemas.microsoft.com/office/drawing/2010/main" xmlns="" w="9525">
+                <a14:hiddenLine xmlns="" xmlns:a14="http://schemas.microsoft.com/office/drawing/2010/main" w="9525">
                   <a:solidFill>
                     <a:srgbClr val="000000"/>
                   </a:solidFill>
@@ -4717,7 +4717,7 @@
             </a:ln>
             <a:extLst>
               <a:ext uri="{91240B29-F687-4f45-9708-019B960494DF}">
-                <a14:hiddenLine xmlns:a14="http://schemas.microsoft.com/office/drawing/2010/main" xmlns="" w="9525">
+                <a14:hiddenLine xmlns="" xmlns:a14="http://schemas.microsoft.com/office/drawing/2010/main" w="9525">
                   <a:solidFill>
                     <a:srgbClr val="000000"/>
                   </a:solidFill>
@@ -4807,7 +4807,7 @@
             </a:ln>
             <a:extLst>
               <a:ext uri="{91240B29-F687-4f45-9708-019B960494DF}">
-                <a14:hiddenLine xmlns:a14="http://schemas.microsoft.com/office/drawing/2010/main" xmlns="" w="9525">
+                <a14:hiddenLine xmlns="" xmlns:a14="http://schemas.microsoft.com/office/drawing/2010/main" w="9525">
                   <a:solidFill>
                     <a:srgbClr val="000000"/>
                   </a:solidFill>
@@ -4869,7 +4869,7 @@
             </a:ln>
             <a:extLst>
               <a:ext uri="{91240B29-F687-4f45-9708-019B960494DF}">
-                <a14:hiddenLine xmlns:a14="http://schemas.microsoft.com/office/drawing/2010/main" xmlns="" w="9525">
+                <a14:hiddenLine xmlns="" xmlns:a14="http://schemas.microsoft.com/office/drawing/2010/main" w="9525">
                   <a:solidFill>
                     <a:srgbClr val="000000"/>
                   </a:solidFill>
@@ -4931,7 +4931,7 @@
             </a:ln>
             <a:extLst>
               <a:ext uri="{91240B29-F687-4f45-9708-019B960494DF}">
-                <a14:hiddenLine xmlns:a14="http://schemas.microsoft.com/office/drawing/2010/main" xmlns="" w="9525">
+                <a14:hiddenLine xmlns="" xmlns:a14="http://schemas.microsoft.com/office/drawing/2010/main" w="9525">
                   <a:solidFill>
                     <a:srgbClr val="000000"/>
                   </a:solidFill>
@@ -5021,7 +5021,7 @@
             </a:ln>
             <a:extLst>
               <a:ext uri="{91240B29-F687-4f45-9708-019B960494DF}">
-                <a14:hiddenLine xmlns:a14="http://schemas.microsoft.com/office/drawing/2010/main" xmlns="" w="9525">
+                <a14:hiddenLine xmlns="" xmlns:a14="http://schemas.microsoft.com/office/drawing/2010/main" w="9525">
                   <a:solidFill>
                     <a:srgbClr val="000000"/>
                   </a:solidFill>
@@ -5089,7 +5089,7 @@
             </a:ln>
             <a:extLst>
               <a:ext uri="{91240B29-F687-4f45-9708-019B960494DF}">
-                <a14:hiddenLine xmlns:a14="http://schemas.microsoft.com/office/drawing/2010/main" xmlns="" w="9525">
+                <a14:hiddenLine xmlns="" xmlns:a14="http://schemas.microsoft.com/office/drawing/2010/main" w="9525">
                   <a:solidFill>
                     <a:srgbClr val="000000"/>
                   </a:solidFill>
@@ -5151,7 +5151,7 @@
             </a:ln>
             <a:extLst>
               <a:ext uri="{91240B29-F687-4f45-9708-019B960494DF}">
-                <a14:hiddenLine xmlns:a14="http://schemas.microsoft.com/office/drawing/2010/main" xmlns="" w="9525">
+                <a14:hiddenLine xmlns="" xmlns:a14="http://schemas.microsoft.com/office/drawing/2010/main" w="9525">
                   <a:solidFill>
                     <a:srgbClr val="000000"/>
                   </a:solidFill>
@@ -5241,7 +5241,7 @@
             </a:ln>
             <a:extLst>
               <a:ext uri="{91240B29-F687-4f45-9708-019B960494DF}">
-                <a14:hiddenLine xmlns:a14="http://schemas.microsoft.com/office/drawing/2010/main" xmlns="" w="9525">
+                <a14:hiddenLine xmlns="" xmlns:a14="http://schemas.microsoft.com/office/drawing/2010/main" w="9525">
                   <a:solidFill>
                     <a:srgbClr val="000000"/>
                   </a:solidFill>
@@ -5303,7 +5303,7 @@
             </a:ln>
             <a:extLst>
               <a:ext uri="{91240B29-F687-4f45-9708-019B960494DF}">
-                <a14:hiddenLine xmlns:a14="http://schemas.microsoft.com/office/drawing/2010/main" xmlns="" w="9525">
+                <a14:hiddenLine xmlns="" xmlns:a14="http://schemas.microsoft.com/office/drawing/2010/main" w="9525">
                   <a:solidFill>
                     <a:srgbClr val="000000"/>
                   </a:solidFill>
@@ -5393,7 +5393,7 @@
             </a:ln>
             <a:extLst>
               <a:ext uri="{91240B29-F687-4f45-9708-019B960494DF}">
-                <a14:hiddenLine xmlns:a14="http://schemas.microsoft.com/office/drawing/2010/main" xmlns="" w="9525">
+                <a14:hiddenLine xmlns="" xmlns:a14="http://schemas.microsoft.com/office/drawing/2010/main" w="9525">
                   <a:solidFill>
                     <a:srgbClr val="000000"/>
                   </a:solidFill>
@@ -5455,7 +5455,7 @@
             </a:ln>
             <a:extLst>
               <a:ext uri="{91240B29-F687-4f45-9708-019B960494DF}">
-                <a14:hiddenLine xmlns:a14="http://schemas.microsoft.com/office/drawing/2010/main" xmlns="" w="9525">
+                <a14:hiddenLine xmlns="" xmlns:a14="http://schemas.microsoft.com/office/drawing/2010/main" w="9525">
                   <a:solidFill>
                     <a:srgbClr val="000000"/>
                   </a:solidFill>
@@ -5545,7 +5545,7 @@
             </a:ln>
             <a:extLst>
               <a:ext uri="{91240B29-F687-4f45-9708-019B960494DF}">
-                <a14:hiddenLine xmlns:a14="http://schemas.microsoft.com/office/drawing/2010/main" xmlns="" w="9525">
+                <a14:hiddenLine xmlns="" xmlns:a14="http://schemas.microsoft.com/office/drawing/2010/main" w="9525">
                   <a:solidFill>
                     <a:srgbClr val="000000"/>
                   </a:solidFill>
@@ -5579,7 +5579,7 @@
             </a:ln>
             <a:extLst>
               <a:ext uri="{91240B29-F687-4f45-9708-019B960494DF}">
-                <a14:hiddenLine xmlns:a14="http://schemas.microsoft.com/office/drawing/2010/main" xmlns="" w="9525">
+                <a14:hiddenLine xmlns="" xmlns:a14="http://schemas.microsoft.com/office/drawing/2010/main" w="9525">
                   <a:solidFill>
                     <a:srgbClr val="000000"/>
                   </a:solidFill>
@@ -5644,7 +5644,7 @@
             </a:ln>
             <a:extLst>
               <a:ext uri="{91240B29-F687-4f45-9708-019B960494DF}">
-                <a14:hiddenLine xmlns:a14="http://schemas.microsoft.com/office/drawing/2010/main" xmlns="" w="9525">
+                <a14:hiddenLine xmlns="" xmlns:a14="http://schemas.microsoft.com/office/drawing/2010/main" w="9525">
                   <a:solidFill>
                     <a:srgbClr val="000000"/>
                   </a:solidFill>
@@ -5734,7 +5734,7 @@
             </a:ln>
             <a:extLst>
               <a:ext uri="{91240B29-F687-4f45-9708-019B960494DF}">
-                <a14:hiddenLine xmlns:a14="http://schemas.microsoft.com/office/drawing/2010/main" xmlns="" w="9525">
+                <a14:hiddenLine xmlns="" xmlns:a14="http://schemas.microsoft.com/office/drawing/2010/main" w="9525">
                   <a:solidFill>
                     <a:srgbClr val="000000"/>
                   </a:solidFill>
@@ -5796,7 +5796,7 @@
             </a:ln>
             <a:extLst>
               <a:ext uri="{91240B29-F687-4f45-9708-019B960494DF}">
-                <a14:hiddenLine xmlns:a14="http://schemas.microsoft.com/office/drawing/2010/main" xmlns="" w="9525">
+                <a14:hiddenLine xmlns="" xmlns:a14="http://schemas.microsoft.com/office/drawing/2010/main" w="9525">
                   <a:solidFill>
                     <a:srgbClr val="000000"/>
                   </a:solidFill>
@@ -5886,7 +5886,7 @@
             </a:ln>
             <a:extLst>
               <a:ext uri="{91240B29-F687-4f45-9708-019B960494DF}">
-                <a14:hiddenLine xmlns:a14="http://schemas.microsoft.com/office/drawing/2010/main" xmlns="" w="9525">
+                <a14:hiddenLine xmlns="" xmlns:a14="http://schemas.microsoft.com/office/drawing/2010/main" w="9525">
                   <a:solidFill>
                     <a:srgbClr val="000000"/>
                   </a:solidFill>
@@ -5976,7 +5976,7 @@
             </a:ln>
             <a:extLst>
               <a:ext uri="{91240B29-F687-4f45-9708-019B960494DF}">
-                <a14:hiddenLine xmlns:a14="http://schemas.microsoft.com/office/drawing/2010/main" xmlns="" w="9525">
+                <a14:hiddenLine xmlns="" xmlns:a14="http://schemas.microsoft.com/office/drawing/2010/main" w="9525">
                   <a:solidFill>
                     <a:srgbClr val="000000"/>
                   </a:solidFill>
@@ -6041,7 +6041,7 @@
             </a:ln>
             <a:extLst>
               <a:ext uri="{91240B29-F687-4f45-9708-019B960494DF}">
-                <a14:hiddenLine xmlns:a14="http://schemas.microsoft.com/office/drawing/2010/main" xmlns="" w="9525">
+                <a14:hiddenLine xmlns="" xmlns:a14="http://schemas.microsoft.com/office/drawing/2010/main" w="9525">
                   <a:solidFill>
                     <a:srgbClr val="000000"/>
                   </a:solidFill>
@@ -6103,7 +6103,7 @@
             </a:ln>
             <a:extLst>
               <a:ext uri="{91240B29-F687-4f45-9708-019B960494DF}">
-                <a14:hiddenLine xmlns:a14="http://schemas.microsoft.com/office/drawing/2010/main" xmlns="" w="9525">
+                <a14:hiddenLine xmlns="" xmlns:a14="http://schemas.microsoft.com/office/drawing/2010/main" w="9525">
                   <a:solidFill>
                     <a:srgbClr val="000000"/>
                   </a:solidFill>
@@ -6193,7 +6193,7 @@
             </a:ln>
             <a:extLst>
               <a:ext uri="{91240B29-F687-4f45-9708-019B960494DF}">
-                <a14:hiddenLine xmlns:a14="http://schemas.microsoft.com/office/drawing/2010/main" xmlns="" w="9525">
+                <a14:hiddenLine xmlns="" xmlns:a14="http://schemas.microsoft.com/office/drawing/2010/main" w="9525">
                   <a:solidFill>
                     <a:srgbClr val="000000"/>
                   </a:solidFill>
@@ -6283,7 +6283,7 @@
             </a:ln>
             <a:extLst>
               <a:ext uri="{91240B29-F687-4f45-9708-019B960494DF}">
-                <a14:hiddenLine xmlns:a14="http://schemas.microsoft.com/office/drawing/2010/main" xmlns="" w="9525">
+                <a14:hiddenLine xmlns="" xmlns:a14="http://schemas.microsoft.com/office/drawing/2010/main" w="9525">
                   <a:solidFill>
                     <a:srgbClr val="000000"/>
                   </a:solidFill>
@@ -6345,7 +6345,7 @@
             </a:ln>
             <a:extLst>
               <a:ext uri="{91240B29-F687-4f45-9708-019B960494DF}">
-                <a14:hiddenLine xmlns:a14="http://schemas.microsoft.com/office/drawing/2010/main" xmlns="" w="9525">
+                <a14:hiddenLine xmlns="" xmlns:a14="http://schemas.microsoft.com/office/drawing/2010/main" w="9525">
                   <a:solidFill>
                     <a:srgbClr val="000000"/>
                   </a:solidFill>
@@ -6465,7 +6465,7 @@
             </a:ln>
             <a:extLst>
               <a:ext uri="{91240B29-F687-4f45-9708-019B960494DF}">
-                <a14:hiddenLine xmlns:a14="http://schemas.microsoft.com/office/drawing/2010/main" xmlns="" w="9525">
+                <a14:hiddenLine xmlns="" xmlns:a14="http://schemas.microsoft.com/office/drawing/2010/main" w="9525">
                   <a:solidFill>
                     <a:srgbClr val="000000"/>
                   </a:solidFill>
@@ -6533,7 +6533,7 @@
             </a:ln>
             <a:extLst>
               <a:ext uri="{91240B29-F687-4f45-9708-019B960494DF}">
-                <a14:hiddenLine xmlns:a14="http://schemas.microsoft.com/office/drawing/2010/main" xmlns="" w="9525">
+                <a14:hiddenLine xmlns="" xmlns:a14="http://schemas.microsoft.com/office/drawing/2010/main" w="9525">
                   <a:solidFill>
                     <a:srgbClr val="000000"/>
                   </a:solidFill>
@@ -6623,7 +6623,7 @@
             </a:ln>
             <a:extLst>
               <a:ext uri="{91240B29-F687-4f45-9708-019B960494DF}">
-                <a14:hiddenLine xmlns:a14="http://schemas.microsoft.com/office/drawing/2010/main" xmlns="" w="9525">
+                <a14:hiddenLine xmlns="" xmlns:a14="http://schemas.microsoft.com/office/drawing/2010/main" w="9525">
                   <a:solidFill>
                     <a:srgbClr val="000000"/>
                   </a:solidFill>
@@ -6763,7 +6763,7 @@
           <a:p>
             <a:fld id="{5ACDEA61-04CE-472E-B3CF-399CA1895EB3}" type="datetimeFigureOut">
               <a:rPr lang="en-SG" smtClean="0"/>
-              <a:t>2/6/2015</a:t>
+              <a:t>3/6/2015</a:t>
             </a:fld>
             <a:endParaRPr lang="en-SG"/>
           </a:p>
@@ -7030,7 +7030,7 @@
           <a:p>
             <a:fld id="{5ACDEA61-04CE-472E-B3CF-399CA1895EB3}" type="datetimeFigureOut">
               <a:rPr lang="en-SG" smtClean="0"/>
-              <a:t>2/6/2015</a:t>
+              <a:t>3/6/2015</a:t>
             </a:fld>
             <a:endParaRPr lang="en-SG"/>
           </a:p>
@@ -7226,7 +7226,7 @@
           <a:p>
             <a:fld id="{5ACDEA61-04CE-472E-B3CF-399CA1895EB3}" type="datetimeFigureOut">
               <a:rPr lang="en-SG" smtClean="0"/>
-              <a:t>2/6/2015</a:t>
+              <a:t>3/6/2015</a:t>
             </a:fld>
             <a:endParaRPr lang="en-SG"/>
           </a:p>
@@ -7489,7 +7489,7 @@
           <a:p>
             <a:fld id="{5ACDEA61-04CE-472E-B3CF-399CA1895EB3}" type="datetimeFigureOut">
               <a:rPr lang="en-SG" smtClean="0"/>
-              <a:t>2/6/2015</a:t>
+              <a:t>3/6/2015</a:t>
             </a:fld>
             <a:endParaRPr lang="en-SG"/>
           </a:p>
@@ -7923,7 +7923,7 @@
           <a:p>
             <a:fld id="{5ACDEA61-04CE-472E-B3CF-399CA1895EB3}" type="datetimeFigureOut">
               <a:rPr lang="en-SG" smtClean="0"/>
-              <a:t>2/6/2015</a:t>
+              <a:t>3/6/2015</a:t>
             </a:fld>
             <a:endParaRPr lang="en-SG"/>
           </a:p>
@@ -8469,7 +8469,7 @@
           <a:p>
             <a:fld id="{5ACDEA61-04CE-472E-B3CF-399CA1895EB3}" type="datetimeFigureOut">
               <a:rPr lang="en-SG" smtClean="0"/>
-              <a:t>2/6/2015</a:t>
+              <a:t>3/6/2015</a:t>
             </a:fld>
             <a:endParaRPr lang="en-SG"/>
           </a:p>
@@ -9189,7 +9189,7 @@
           <a:p>
             <a:fld id="{5ACDEA61-04CE-472E-B3CF-399CA1895EB3}" type="datetimeFigureOut">
               <a:rPr lang="en-SG" smtClean="0"/>
-              <a:t>2/6/2015</a:t>
+              <a:t>3/6/2015</a:t>
             </a:fld>
             <a:endParaRPr lang="en-SG"/>
           </a:p>
@@ -9359,7 +9359,7 @@
           <a:p>
             <a:fld id="{5ACDEA61-04CE-472E-B3CF-399CA1895EB3}" type="datetimeFigureOut">
               <a:rPr lang="en-SG" smtClean="0"/>
-              <a:t>2/6/2015</a:t>
+              <a:t>3/6/2015</a:t>
             </a:fld>
             <a:endParaRPr lang="en-SG"/>
           </a:p>
@@ -9539,7 +9539,7 @@
           <a:p>
             <a:fld id="{5ACDEA61-04CE-472E-B3CF-399CA1895EB3}" type="datetimeFigureOut">
               <a:rPr lang="en-SG" smtClean="0"/>
-              <a:t>2/6/2015</a:t>
+              <a:t>3/6/2015</a:t>
             </a:fld>
             <a:endParaRPr lang="en-SG"/>
           </a:p>
@@ -9709,7 +9709,7 @@
           <a:p>
             <a:fld id="{5ACDEA61-04CE-472E-B3CF-399CA1895EB3}" type="datetimeFigureOut">
               <a:rPr lang="en-SG" smtClean="0"/>
-              <a:t>2/6/2015</a:t>
+              <a:t>3/6/2015</a:t>
             </a:fld>
             <a:endParaRPr lang="en-SG"/>
           </a:p>
@@ -9959,7 +9959,7 @@
           <a:p>
             <a:fld id="{5ACDEA61-04CE-472E-B3CF-399CA1895EB3}" type="datetimeFigureOut">
               <a:rPr lang="en-SG" smtClean="0"/>
-              <a:t>2/6/2015</a:t>
+              <a:t>3/6/2015</a:t>
             </a:fld>
             <a:endParaRPr lang="en-SG"/>
           </a:p>
@@ -10191,7 +10191,7 @@
           <a:p>
             <a:fld id="{5ACDEA61-04CE-472E-B3CF-399CA1895EB3}" type="datetimeFigureOut">
               <a:rPr lang="en-SG" smtClean="0"/>
-              <a:t>2/6/2015</a:t>
+              <a:t>3/6/2015</a:t>
             </a:fld>
             <a:endParaRPr lang="en-SG"/>
           </a:p>
@@ -10572,7 +10572,7 @@
           <a:p>
             <a:fld id="{5ACDEA61-04CE-472E-B3CF-399CA1895EB3}" type="datetimeFigureOut">
               <a:rPr lang="en-SG" smtClean="0"/>
-              <a:t>2/6/2015</a:t>
+              <a:t>3/6/2015</a:t>
             </a:fld>
             <a:endParaRPr lang="en-SG"/>
           </a:p>
@@ -10690,7 +10690,7 @@
           <a:p>
             <a:fld id="{5ACDEA61-04CE-472E-B3CF-399CA1895EB3}" type="datetimeFigureOut">
               <a:rPr lang="en-SG" smtClean="0"/>
-              <a:t>2/6/2015</a:t>
+              <a:t>3/6/2015</a:t>
             </a:fld>
             <a:endParaRPr lang="en-SG"/>
           </a:p>
@@ -10785,7 +10785,7 @@
           <a:p>
             <a:fld id="{5ACDEA61-04CE-472E-B3CF-399CA1895EB3}" type="datetimeFigureOut">
               <a:rPr lang="en-SG" smtClean="0"/>
-              <a:t>2/6/2015</a:t>
+              <a:t>3/6/2015</a:t>
             </a:fld>
             <a:endParaRPr lang="en-SG"/>
           </a:p>
@@ -11034,7 +11034,7 @@
           <a:p>
             <a:fld id="{5ACDEA61-04CE-472E-B3CF-399CA1895EB3}" type="datetimeFigureOut">
               <a:rPr lang="en-SG" smtClean="0"/>
-              <a:t>2/6/2015</a:t>
+              <a:t>3/6/2015</a:t>
             </a:fld>
             <a:endParaRPr lang="en-SG"/>
           </a:p>
@@ -11314,7 +11314,7 @@
           <a:p>
             <a:fld id="{5ACDEA61-04CE-472E-B3CF-399CA1895EB3}" type="datetimeFigureOut">
               <a:rPr lang="en-SG" smtClean="0"/>
-              <a:t>2/6/2015</a:t>
+              <a:t>3/6/2015</a:t>
             </a:fld>
             <a:endParaRPr lang="en-SG"/>
           </a:p>
@@ -11437,7 +11437,7 @@
           <a:noFill/>
           <a:extLst>
             <a:ext uri="{909E8E84-426E-40dd-AFC4-6F175D3DCCD1}">
-              <a14:hiddenFill xmlns:a14="http://schemas.microsoft.com/office/drawing/2010/main" xmlns="">
+              <a14:hiddenFill xmlns="" xmlns:a14="http://schemas.microsoft.com/office/drawing/2010/main">
                 <a:solidFill>
                   <a:srgbClr val="FFFFFF"/>
                 </a:solidFill>
@@ -11511,7 +11511,7 @@
               </a:ln>
               <a:extLst>
                 <a:ext uri="{91240B29-F687-4f45-9708-019B960494DF}">
-                  <a14:hiddenLine xmlns:a14="http://schemas.microsoft.com/office/drawing/2010/main" xmlns="" w="9525">
+                  <a14:hiddenLine xmlns="" xmlns:a14="http://schemas.microsoft.com/office/drawing/2010/main" w="9525">
                     <a:solidFill>
                       <a:srgbClr val="000000"/>
                     </a:solidFill>
@@ -11601,7 +11601,7 @@
               </a:ln>
               <a:extLst>
                 <a:ext uri="{91240B29-F687-4f45-9708-019B960494DF}">
-                  <a14:hiddenLine xmlns:a14="http://schemas.microsoft.com/office/drawing/2010/main" xmlns="" w="9525">
+                  <a14:hiddenLine xmlns="" xmlns:a14="http://schemas.microsoft.com/office/drawing/2010/main" w="9525">
                     <a:solidFill>
                       <a:srgbClr val="000000"/>
                     </a:solidFill>
@@ -11691,7 +11691,7 @@
               </a:ln>
               <a:extLst>
                 <a:ext uri="{91240B29-F687-4f45-9708-019B960494DF}">
-                  <a14:hiddenLine xmlns:a14="http://schemas.microsoft.com/office/drawing/2010/main" xmlns="" w="9525">
+                  <a14:hiddenLine xmlns="" xmlns:a14="http://schemas.microsoft.com/office/drawing/2010/main" w="9525">
                     <a:solidFill>
                       <a:srgbClr val="000000"/>
                     </a:solidFill>
@@ -11753,7 +11753,7 @@
               </a:ln>
               <a:extLst>
                 <a:ext uri="{91240B29-F687-4f45-9708-019B960494DF}">
-                  <a14:hiddenLine xmlns:a14="http://schemas.microsoft.com/office/drawing/2010/main" xmlns="" w="9525">
+                  <a14:hiddenLine xmlns="" xmlns:a14="http://schemas.microsoft.com/office/drawing/2010/main" w="9525">
                     <a:solidFill>
                       <a:srgbClr val="000000"/>
                     </a:solidFill>
@@ -11843,7 +11843,7 @@
               </a:ln>
               <a:extLst>
                 <a:ext uri="{91240B29-F687-4f45-9708-019B960494DF}">
-                  <a14:hiddenLine xmlns:a14="http://schemas.microsoft.com/office/drawing/2010/main" xmlns="" w="9525">
+                  <a14:hiddenLine xmlns="" xmlns:a14="http://schemas.microsoft.com/office/drawing/2010/main" w="9525">
                     <a:solidFill>
                       <a:srgbClr val="000000"/>
                     </a:solidFill>
@@ -11905,7 +11905,7 @@
               </a:ln>
               <a:extLst>
                 <a:ext uri="{91240B29-F687-4f45-9708-019B960494DF}">
-                  <a14:hiddenLine xmlns:a14="http://schemas.microsoft.com/office/drawing/2010/main" xmlns="" w="9525">
+                  <a14:hiddenLine xmlns="" xmlns:a14="http://schemas.microsoft.com/office/drawing/2010/main" w="9525">
                     <a:solidFill>
                       <a:srgbClr val="000000"/>
                     </a:solidFill>
@@ -11967,7 +11967,7 @@
               </a:ln>
               <a:extLst>
                 <a:ext uri="{91240B29-F687-4f45-9708-019B960494DF}">
-                  <a14:hiddenLine xmlns:a14="http://schemas.microsoft.com/office/drawing/2010/main" xmlns="" w="9525">
+                  <a14:hiddenLine xmlns="" xmlns:a14="http://schemas.microsoft.com/office/drawing/2010/main" w="9525">
                     <a:solidFill>
                       <a:srgbClr val="000000"/>
                     </a:solidFill>
@@ -12057,7 +12057,7 @@
               </a:ln>
               <a:extLst>
                 <a:ext uri="{91240B29-F687-4f45-9708-019B960494DF}">
-                  <a14:hiddenLine xmlns:a14="http://schemas.microsoft.com/office/drawing/2010/main" xmlns="" w="9525">
+                  <a14:hiddenLine xmlns="" xmlns:a14="http://schemas.microsoft.com/office/drawing/2010/main" w="9525">
                     <a:solidFill>
                       <a:srgbClr val="000000"/>
                     </a:solidFill>
@@ -12147,7 +12147,7 @@
               </a:ln>
               <a:extLst>
                 <a:ext uri="{91240B29-F687-4f45-9708-019B960494DF}">
-                  <a14:hiddenLine xmlns:a14="http://schemas.microsoft.com/office/drawing/2010/main" xmlns="" w="9525">
+                  <a14:hiddenLine xmlns="" xmlns:a14="http://schemas.microsoft.com/office/drawing/2010/main" w="9525">
                     <a:solidFill>
                       <a:srgbClr val="000000"/>
                     </a:solidFill>
@@ -12209,7 +12209,7 @@
               </a:ln>
               <a:extLst>
                 <a:ext uri="{91240B29-F687-4f45-9708-019B960494DF}">
-                  <a14:hiddenLine xmlns:a14="http://schemas.microsoft.com/office/drawing/2010/main" xmlns="" w="9525">
+                  <a14:hiddenLine xmlns="" xmlns:a14="http://schemas.microsoft.com/office/drawing/2010/main" w="9525">
                     <a:solidFill>
                       <a:srgbClr val="000000"/>
                     </a:solidFill>
@@ -12319,7 +12319,7 @@
               </a:ln>
               <a:extLst>
                 <a:ext uri="{91240B29-F687-4f45-9708-019B960494DF}">
-                  <a14:hiddenLine xmlns:a14="http://schemas.microsoft.com/office/drawing/2010/main" xmlns="" w="9525">
+                  <a14:hiddenLine xmlns="" xmlns:a14="http://schemas.microsoft.com/office/drawing/2010/main" w="9525">
                     <a:solidFill>
                       <a:srgbClr val="000000"/>
                     </a:solidFill>
@@ -12403,7 +12403,7 @@
               </a:ln>
               <a:extLst>
                 <a:ext uri="{91240B29-F687-4f45-9708-019B960494DF}">
-                  <a14:hiddenLine xmlns:a14="http://schemas.microsoft.com/office/drawing/2010/main" xmlns="" w="9525">
+                  <a14:hiddenLine xmlns="" xmlns:a14="http://schemas.microsoft.com/office/drawing/2010/main" w="9525">
                     <a:solidFill>
                       <a:srgbClr val="000000"/>
                     </a:solidFill>
@@ -12465,7 +12465,7 @@
               </a:ln>
               <a:extLst>
                 <a:ext uri="{91240B29-F687-4f45-9708-019B960494DF}">
-                  <a14:hiddenLine xmlns:a14="http://schemas.microsoft.com/office/drawing/2010/main" xmlns="" w="9525">
+                  <a14:hiddenLine xmlns="" xmlns:a14="http://schemas.microsoft.com/office/drawing/2010/main" w="9525">
                     <a:solidFill>
                       <a:srgbClr val="000000"/>
                     </a:solidFill>
@@ -12527,7 +12527,7 @@
               </a:ln>
               <a:extLst>
                 <a:ext uri="{91240B29-F687-4f45-9708-019B960494DF}">
-                  <a14:hiddenLine xmlns:a14="http://schemas.microsoft.com/office/drawing/2010/main" xmlns="" w="9525">
+                  <a14:hiddenLine xmlns="" xmlns:a14="http://schemas.microsoft.com/office/drawing/2010/main" w="9525">
                     <a:solidFill>
                       <a:srgbClr val="000000"/>
                     </a:solidFill>
@@ -12617,7 +12617,7 @@
               </a:ln>
               <a:extLst>
                 <a:ext uri="{91240B29-F687-4f45-9708-019B960494DF}">
-                  <a14:hiddenLine xmlns:a14="http://schemas.microsoft.com/office/drawing/2010/main" xmlns="" w="9525">
+                  <a14:hiddenLine xmlns="" xmlns:a14="http://schemas.microsoft.com/office/drawing/2010/main" w="9525">
                     <a:solidFill>
                       <a:srgbClr val="000000"/>
                     </a:solidFill>
@@ -12651,7 +12651,7 @@
               </a:ln>
               <a:extLst>
                 <a:ext uri="{91240B29-F687-4f45-9708-019B960494DF}">
-                  <a14:hiddenLine xmlns:a14="http://schemas.microsoft.com/office/drawing/2010/main" xmlns="" w="9525">
+                  <a14:hiddenLine xmlns="" xmlns:a14="http://schemas.microsoft.com/office/drawing/2010/main" w="9525">
                     <a:solidFill>
                       <a:srgbClr val="000000"/>
                     </a:solidFill>
@@ -12716,7 +12716,7 @@
               </a:ln>
               <a:extLst>
                 <a:ext uri="{91240B29-F687-4f45-9708-019B960494DF}">
-                  <a14:hiddenLine xmlns:a14="http://schemas.microsoft.com/office/drawing/2010/main" xmlns="" w="9525">
+                  <a14:hiddenLine xmlns="" xmlns:a14="http://schemas.microsoft.com/office/drawing/2010/main" w="9525">
                     <a:solidFill>
                       <a:srgbClr val="000000"/>
                     </a:solidFill>
@@ -12806,7 +12806,7 @@
               </a:ln>
               <a:extLst>
                 <a:ext uri="{91240B29-F687-4f45-9708-019B960494DF}">
-                  <a14:hiddenLine xmlns:a14="http://schemas.microsoft.com/office/drawing/2010/main" xmlns="" w="9525">
+                  <a14:hiddenLine xmlns="" xmlns:a14="http://schemas.microsoft.com/office/drawing/2010/main" w="9525">
                     <a:solidFill>
                       <a:srgbClr val="000000"/>
                     </a:solidFill>
@@ -12868,7 +12868,7 @@
               </a:ln>
               <a:extLst>
                 <a:ext uri="{91240B29-F687-4f45-9708-019B960494DF}">
-                  <a14:hiddenLine xmlns:a14="http://schemas.microsoft.com/office/drawing/2010/main" xmlns="" w="9525">
+                  <a14:hiddenLine xmlns="" xmlns:a14="http://schemas.microsoft.com/office/drawing/2010/main" w="9525">
                     <a:solidFill>
                       <a:srgbClr val="000000"/>
                     </a:solidFill>
@@ -12958,7 +12958,7 @@
               </a:ln>
               <a:extLst>
                 <a:ext uri="{91240B29-F687-4f45-9708-019B960494DF}">
-                  <a14:hiddenLine xmlns:a14="http://schemas.microsoft.com/office/drawing/2010/main" xmlns="" w="9525">
+                  <a14:hiddenLine xmlns="" xmlns:a14="http://schemas.microsoft.com/office/drawing/2010/main" w="9525">
                     <a:solidFill>
                       <a:srgbClr val="000000"/>
                     </a:solidFill>
@@ -13023,7 +13023,7 @@
               </a:ln>
               <a:extLst>
                 <a:ext uri="{91240B29-F687-4f45-9708-019B960494DF}">
-                  <a14:hiddenLine xmlns:a14="http://schemas.microsoft.com/office/drawing/2010/main" xmlns="" w="9525">
+                  <a14:hiddenLine xmlns="" xmlns:a14="http://schemas.microsoft.com/office/drawing/2010/main" w="9525">
                     <a:solidFill>
                       <a:srgbClr val="000000"/>
                     </a:solidFill>
@@ -13085,7 +13085,7 @@
               </a:ln>
               <a:extLst>
                 <a:ext uri="{91240B29-F687-4f45-9708-019B960494DF}">
-                  <a14:hiddenLine xmlns:a14="http://schemas.microsoft.com/office/drawing/2010/main" xmlns="" w="9525">
+                  <a14:hiddenLine xmlns="" xmlns:a14="http://schemas.microsoft.com/office/drawing/2010/main" w="9525">
                     <a:solidFill>
                       <a:srgbClr val="000000"/>
                     </a:solidFill>
@@ -13175,7 +13175,7 @@
               </a:ln>
               <a:extLst>
                 <a:ext uri="{91240B29-F687-4f45-9708-019B960494DF}">
-                  <a14:hiddenLine xmlns:a14="http://schemas.microsoft.com/office/drawing/2010/main" xmlns="" w="9525">
+                  <a14:hiddenLine xmlns="" xmlns:a14="http://schemas.microsoft.com/office/drawing/2010/main" w="9525">
                     <a:solidFill>
                       <a:srgbClr val="000000"/>
                     </a:solidFill>
@@ -13265,7 +13265,7 @@
               </a:ln>
               <a:extLst>
                 <a:ext uri="{91240B29-F687-4f45-9708-019B960494DF}">
-                  <a14:hiddenLine xmlns:a14="http://schemas.microsoft.com/office/drawing/2010/main" xmlns="" w="9525">
+                  <a14:hiddenLine xmlns="" xmlns:a14="http://schemas.microsoft.com/office/drawing/2010/main" w="9525">
                     <a:solidFill>
                       <a:srgbClr val="000000"/>
                     </a:solidFill>
@@ -13330,7 +13330,7 @@
               </a:ln>
               <a:extLst>
                 <a:ext uri="{91240B29-F687-4f45-9708-019B960494DF}">
-                  <a14:hiddenLine xmlns:a14="http://schemas.microsoft.com/office/drawing/2010/main" xmlns="" w="9525">
+                  <a14:hiddenLine xmlns="" xmlns:a14="http://schemas.microsoft.com/office/drawing/2010/main" w="9525">
                     <a:solidFill>
                       <a:srgbClr val="000000"/>
                     </a:solidFill>
@@ -13450,7 +13450,7 @@
               </a:ln>
               <a:extLst>
                 <a:ext uri="{91240B29-F687-4f45-9708-019B960494DF}">
-                  <a14:hiddenLine xmlns:a14="http://schemas.microsoft.com/office/drawing/2010/main" xmlns="" w="9525">
+                  <a14:hiddenLine xmlns="" xmlns:a14="http://schemas.microsoft.com/office/drawing/2010/main" w="9525">
                     <a:solidFill>
                       <a:srgbClr val="000000"/>
                     </a:solidFill>
@@ -13531,7 +13531,7 @@
               </a:ln>
               <a:extLst>
                 <a:ext uri="{91240B29-F687-4f45-9708-019B960494DF}">
-                  <a14:hiddenLine xmlns:a14="http://schemas.microsoft.com/office/drawing/2010/main" xmlns="" w="9525">
+                  <a14:hiddenLine xmlns="" xmlns:a14="http://schemas.microsoft.com/office/drawing/2010/main" w="9525">
                     <a:solidFill>
                       <a:srgbClr val="000000"/>
                     </a:solidFill>
@@ -13646,7 +13646,7 @@
               </a:ln>
               <a:extLst>
                 <a:ext uri="{91240B29-F687-4f45-9708-019B960494DF}">
-                  <a14:hiddenLine xmlns:a14="http://schemas.microsoft.com/office/drawing/2010/main" xmlns="" w="9525">
+                  <a14:hiddenLine xmlns="" xmlns:a14="http://schemas.microsoft.com/office/drawing/2010/main" w="9525">
                     <a:solidFill>
                       <a:srgbClr val="000000"/>
                     </a:solidFill>
@@ -13736,7 +13736,7 @@
               </a:ln>
               <a:extLst>
                 <a:ext uri="{91240B29-F687-4f45-9708-019B960494DF}">
-                  <a14:hiddenLine xmlns:a14="http://schemas.microsoft.com/office/drawing/2010/main" xmlns="" w="9525">
+                  <a14:hiddenLine xmlns="" xmlns:a14="http://schemas.microsoft.com/office/drawing/2010/main" w="9525">
                     <a:solidFill>
                       <a:srgbClr val="000000"/>
                     </a:solidFill>
@@ -13801,7 +13801,7 @@
               </a:ln>
               <a:extLst>
                 <a:ext uri="{91240B29-F687-4f45-9708-019B960494DF}">
-                  <a14:hiddenLine xmlns:a14="http://schemas.microsoft.com/office/drawing/2010/main" xmlns="" w="9525">
+                  <a14:hiddenLine xmlns="" xmlns:a14="http://schemas.microsoft.com/office/drawing/2010/main" w="9525">
                     <a:solidFill>
                       <a:srgbClr val="000000"/>
                     </a:solidFill>
@@ -13891,7 +13891,7 @@
               </a:ln>
               <a:extLst>
                 <a:ext uri="{91240B29-F687-4f45-9708-019B960494DF}">
-                  <a14:hiddenLine xmlns:a14="http://schemas.microsoft.com/office/drawing/2010/main" xmlns="" w="9525">
+                  <a14:hiddenLine xmlns="" xmlns:a14="http://schemas.microsoft.com/office/drawing/2010/main" w="9525">
                     <a:solidFill>
                       <a:srgbClr val="000000"/>
                     </a:solidFill>
@@ -13959,7 +13959,7 @@
               </a:ln>
               <a:extLst>
                 <a:ext uri="{91240B29-F687-4f45-9708-019B960494DF}">
-                  <a14:hiddenLine xmlns:a14="http://schemas.microsoft.com/office/drawing/2010/main" xmlns="" w="9525">
+                  <a14:hiddenLine xmlns="" xmlns:a14="http://schemas.microsoft.com/office/drawing/2010/main" w="9525">
                     <a:solidFill>
                       <a:srgbClr val="000000"/>
                     </a:solidFill>
@@ -14049,7 +14049,7 @@
               </a:ln>
               <a:extLst>
                 <a:ext uri="{91240B29-F687-4f45-9708-019B960494DF}">
-                  <a14:hiddenLine xmlns:a14="http://schemas.microsoft.com/office/drawing/2010/main" xmlns="" w="9525">
+                  <a14:hiddenLine xmlns="" xmlns:a14="http://schemas.microsoft.com/office/drawing/2010/main" w="9525">
                     <a:solidFill>
                       <a:srgbClr val="000000"/>
                     </a:solidFill>
@@ -14117,7 +14117,7 @@
               </a:ln>
               <a:extLst>
                 <a:ext uri="{91240B29-F687-4f45-9708-019B960494DF}">
-                  <a14:hiddenLine xmlns:a14="http://schemas.microsoft.com/office/drawing/2010/main" xmlns="" w="9525">
+                  <a14:hiddenLine xmlns="" xmlns:a14="http://schemas.microsoft.com/office/drawing/2010/main" w="9525">
                     <a:solidFill>
                       <a:srgbClr val="000000"/>
                     </a:solidFill>
@@ -14207,7 +14207,7 @@
               </a:ln>
               <a:extLst>
                 <a:ext uri="{91240B29-F687-4f45-9708-019B960494DF}">
-                  <a14:hiddenLine xmlns:a14="http://schemas.microsoft.com/office/drawing/2010/main" xmlns="" w="9525">
+                  <a14:hiddenLine xmlns="" xmlns:a14="http://schemas.microsoft.com/office/drawing/2010/main" w="9525">
                     <a:solidFill>
                       <a:srgbClr val="000000"/>
                     </a:solidFill>
@@ -14241,7 +14241,7 @@
               </a:ln>
               <a:extLst>
                 <a:ext uri="{91240B29-F687-4f45-9708-019B960494DF}">
-                  <a14:hiddenLine xmlns:a14="http://schemas.microsoft.com/office/drawing/2010/main" xmlns="" w="9525">
+                  <a14:hiddenLine xmlns="" xmlns:a14="http://schemas.microsoft.com/office/drawing/2010/main" w="9525">
                     <a:solidFill>
                       <a:srgbClr val="000000"/>
                     </a:solidFill>
@@ -14381,7 +14381,7 @@
           <a:p>
             <a:fld id="{5ACDEA61-04CE-472E-B3CF-399CA1895EB3}" type="datetimeFigureOut">
               <a:rPr lang="en-SG" smtClean="0"/>
-              <a:t>2/6/2015</a:t>
+              <a:t>3/6/2015</a:t>
             </a:fld>
             <a:endParaRPr lang="en-SG"/>
           </a:p>
@@ -16472,9 +16472,10 @@
           <a:lstStyle/>
           <a:p>
             <a:r>
-              <a:rPr lang="en-SG" dirty="0"/>
-              <a:t>KEY FEATURES</a:t>
-            </a:r>
+              <a:rPr lang="en-SG" dirty="0" smtClean="0"/>
+              <a:t>Objectives</a:t>
+            </a:r>
+            <a:endParaRPr lang="en-SG" dirty="0"/>
           </a:p>
         </p:txBody>
       </p:sp>
@@ -16488,63 +16489,32 @@
             <p:ph idx="1"/>
           </p:nvPr>
         </p:nvSpPr>
-        <p:spPr>
-          <a:xfrm>
-            <a:off x="1141412" y="2249486"/>
-            <a:ext cx="9905999" cy="4197033"/>
-          </a:xfrm>
-        </p:spPr>
+        <p:spPr/>
         <p:txBody>
-          <a:bodyPr>
-            <a:normAutofit fontScale="92500" lnSpcReduction="10000"/>
-          </a:bodyPr>
+          <a:bodyPr/>
           <a:lstStyle/>
           <a:p>
             <a:r>
-              <a:rPr lang="en-GB" dirty="0" smtClean="0"/>
-              <a:t>Reservation Management</a:t>
-            </a:r>
-          </a:p>
-          <a:p>
-            <a:r>
-              <a:rPr lang="en-GB" dirty="0" smtClean="0"/>
-              <a:t>Track other Revenue Services</a:t>
-            </a:r>
-          </a:p>
-          <a:p>
-            <a:r>
-              <a:rPr lang="en-GB" dirty="0" smtClean="0"/>
-              <a:t>Rate Control</a:t>
-            </a:r>
-          </a:p>
-          <a:p>
-            <a:r>
-              <a:rPr lang="en-GB" dirty="0" smtClean="0"/>
-              <a:t>Generating Reports</a:t>
-            </a:r>
-          </a:p>
-          <a:p>
-            <a:r>
-              <a:rPr lang="en-GB" dirty="0" smtClean="0"/>
-              <a:t>Customer Management</a:t>
-            </a:r>
-          </a:p>
-          <a:p>
-            <a:r>
-              <a:rPr lang="en-GB" dirty="0" smtClean="0"/>
-              <a:t>Employee and Housekeeping Tracking</a:t>
-            </a:r>
-          </a:p>
-          <a:p>
-            <a:r>
-              <a:rPr lang="en-GB" dirty="0" smtClean="0"/>
-              <a:t>Invoices and Statements</a:t>
-            </a:r>
-          </a:p>
-          <a:p>
-            <a:r>
-              <a:rPr lang="en-GB" dirty="0" smtClean="0"/>
-              <a:t>Flexible Payment Options</a:t>
+              <a:rPr lang="en-SG" dirty="0" smtClean="0"/>
+              <a:t>Improve business</a:t>
+            </a:r>
+          </a:p>
+          <a:p>
+            <a:r>
+              <a:rPr lang="en-SG" dirty="0" smtClean="0"/>
+              <a:t>Get more customers</a:t>
+            </a:r>
+          </a:p>
+          <a:p>
+            <a:r>
+              <a:rPr lang="en-SG" dirty="0" smtClean="0"/>
+              <a:t>Hotel to be more popular</a:t>
+            </a:r>
+          </a:p>
+          <a:p>
+            <a:r>
+              <a:rPr lang="en-SG" dirty="0" smtClean="0"/>
+              <a:t>Get the hotel to be know worldwide</a:t>
             </a:r>
             <a:endParaRPr lang="en-SG" dirty="0"/>
           </a:p>
@@ -16553,7 +16523,7 @@
     </p:spTree>
     <p:extLst>
       <p:ext uri="{BB962C8B-B14F-4D97-AF65-F5344CB8AC3E}">
-        <p14:creationId xmlns:p14="http://schemas.microsoft.com/office/powerpoint/2010/main" val="4167274779"/>
+        <p14:creationId xmlns:p14="http://schemas.microsoft.com/office/powerpoint/2010/main" val="3128582280"/>
       </p:ext>
     </p:extLst>
   </p:cSld>
@@ -16603,10 +16573,9 @@
           <a:lstStyle/>
           <a:p>
             <a:r>
-              <a:rPr lang="en-SG" dirty="0" smtClean="0"/>
-              <a:t>Objectives</a:t>
-            </a:r>
-            <a:endParaRPr lang="en-SG" dirty="0"/>
+              <a:rPr lang="en-SG" dirty="0"/>
+              <a:t>KEY FEATURES</a:t>
+            </a:r>
           </a:p>
         </p:txBody>
       </p:sp>
@@ -16620,32 +16589,63 @@
             <p:ph idx="1"/>
           </p:nvPr>
         </p:nvSpPr>
-        <p:spPr/>
+        <p:spPr>
+          <a:xfrm>
+            <a:off x="1141412" y="2249486"/>
+            <a:ext cx="9905999" cy="4197033"/>
+          </a:xfrm>
+        </p:spPr>
         <p:txBody>
-          <a:bodyPr/>
+          <a:bodyPr>
+            <a:normAutofit fontScale="92500" lnSpcReduction="10000"/>
+          </a:bodyPr>
           <a:lstStyle/>
           <a:p>
             <a:r>
-              <a:rPr lang="en-SG" dirty="0" smtClean="0"/>
-              <a:t>Improve business</a:t>
-            </a:r>
-          </a:p>
-          <a:p>
-            <a:r>
-              <a:rPr lang="en-SG" dirty="0" smtClean="0"/>
-              <a:t>Get more customers</a:t>
-            </a:r>
-          </a:p>
-          <a:p>
-            <a:r>
-              <a:rPr lang="en-SG" dirty="0" smtClean="0"/>
-              <a:t>Hotel to be more popular</a:t>
-            </a:r>
-          </a:p>
-          <a:p>
-            <a:r>
-              <a:rPr lang="en-SG" dirty="0" smtClean="0"/>
-              <a:t>Get the hotel to be know worldwide</a:t>
+              <a:rPr lang="en-GB" dirty="0" smtClean="0"/>
+              <a:t>Reservation Management</a:t>
+            </a:r>
+          </a:p>
+          <a:p>
+            <a:r>
+              <a:rPr lang="en-GB" dirty="0" smtClean="0"/>
+              <a:t>Track other Revenue Services</a:t>
+            </a:r>
+          </a:p>
+          <a:p>
+            <a:r>
+              <a:rPr lang="en-GB" dirty="0" smtClean="0"/>
+              <a:t>Rate Control</a:t>
+            </a:r>
+          </a:p>
+          <a:p>
+            <a:r>
+              <a:rPr lang="en-GB" dirty="0" smtClean="0"/>
+              <a:t>Generating Reports</a:t>
+            </a:r>
+          </a:p>
+          <a:p>
+            <a:r>
+              <a:rPr lang="en-GB" dirty="0" smtClean="0"/>
+              <a:t>Customer Management</a:t>
+            </a:r>
+          </a:p>
+          <a:p>
+            <a:r>
+              <a:rPr lang="en-GB" dirty="0" smtClean="0"/>
+              <a:t>Employee and Housekeeping Tracking</a:t>
+            </a:r>
+          </a:p>
+          <a:p>
+            <a:r>
+              <a:rPr lang="en-GB" dirty="0" smtClean="0"/>
+              <a:t>Invoices and Statements</a:t>
+            </a:r>
+          </a:p>
+          <a:p>
+            <a:r>
+              <a:rPr lang="en-GB" dirty="0" smtClean="0"/>
+              <a:t>Flexible Payment Options</a:t>
             </a:r>
             <a:endParaRPr lang="en-SG" dirty="0"/>
           </a:p>
@@ -16654,7 +16654,7 @@
     </p:spTree>
     <p:extLst>
       <p:ext uri="{BB962C8B-B14F-4D97-AF65-F5344CB8AC3E}">
-        <p14:creationId xmlns:p14="http://schemas.microsoft.com/office/powerpoint/2010/main" val="3128582280"/>
+        <p14:creationId xmlns:p14="http://schemas.microsoft.com/office/powerpoint/2010/main" val="4167274779"/>
       </p:ext>
     </p:extLst>
   </p:cSld>

</xml_diff>